<commit_message>
minor changes to pptx
</commit_message>
<xml_diff>
--- a/Publishments/03_Presentations/01_TeamPresentation/01_TeamPresentation_CurryWurst.pptx
+++ b/Publishments/03_Presentations/01_TeamPresentation/01_TeamPresentation_CurryWurst.pptx
@@ -209,20 +209,20 @@
             <ac:picMk id="5" creationId="{8C18A098-47A5-48A4-BE38-BFC5E2711EC7}"/>
           </ac:picMkLst>
         </pc:picChg>
+        <pc:picChg chg="add del mod">
+          <ac:chgData name="Moritz Spiller" userId="ee7d68fad518d8d2" providerId="LiveId" clId="{ADF8F89C-5D3F-4B4C-AD0C-8E399D11AB51}" dt="2018-04-13T16:29:07.697" v="301" actId="478"/>
+          <ac:picMkLst>
+            <pc:docMk/>
+            <pc:sldMk cId="4103309497" sldId="257"/>
+            <ac:picMk id="5" creationId="{3DEC925B-645B-4957-ADEB-0DC34C6AAB77}"/>
+          </ac:picMkLst>
+        </pc:picChg>
         <pc:picChg chg="add mod">
           <ac:chgData name="Moritz Spiller" userId="ee7d68fad518d8d2" providerId="LiveId" clId="{ADF8F89C-5D3F-4B4C-AD0C-8E399D11AB51}" dt="2018-04-13T18:11:37.057" v="438" actId="1076"/>
           <ac:picMkLst>
             <pc:docMk/>
             <pc:sldMk cId="4103309497" sldId="257"/>
             <ac:picMk id="5" creationId="{E7298296-26F2-4A7F-9E55-7AC714DB3A96}"/>
-          </ac:picMkLst>
-        </pc:picChg>
-        <pc:picChg chg="add del mod">
-          <ac:chgData name="Moritz Spiller" userId="ee7d68fad518d8d2" providerId="LiveId" clId="{ADF8F89C-5D3F-4B4C-AD0C-8E399D11AB51}" dt="2018-04-13T16:29:07.697" v="301" actId="478"/>
-          <ac:picMkLst>
-            <pc:docMk/>
-            <pc:sldMk cId="4103309497" sldId="257"/>
-            <ac:picMk id="5" creationId="{3DEC925B-645B-4957-ADEB-0DC34C6AAB77}"/>
           </ac:picMkLst>
         </pc:picChg>
         <pc:picChg chg="add del mod">
@@ -595,7 +595,7 @@
   <pc:docChgLst>
     <pc:chgData name="Moritz Spiller" userId="ee7d68fad518d8d2" providerId="LiveId" clId="{F8A47109-9EF6-4448-9F3E-1242B3806D24}"/>
     <pc:docChg chg="custSel modSld modMainMaster">
-      <pc:chgData name="Moritz Spiller" userId="ee7d68fad518d8d2" providerId="LiveId" clId="{F8A47109-9EF6-4448-9F3E-1242B3806D24}" dt="2018-04-16T20:56:57.745" v="2779" actId="20577"/>
+      <pc:chgData name="Moritz Spiller" userId="ee7d68fad518d8d2" providerId="LiveId" clId="{F8A47109-9EF6-4448-9F3E-1242B3806D24}" dt="2018-04-17T20:38:07.808" v="2784" actId="20577"/>
       <pc:docMkLst>
         <pc:docMk/>
       </pc:docMkLst>
@@ -668,7 +668,7 @@
         </pc:spChg>
       </pc:sldChg>
       <pc:sldChg chg="modSp modNotesTx">
-        <pc:chgData name="Moritz Spiller" userId="ee7d68fad518d8d2" providerId="LiveId" clId="{F8A47109-9EF6-4448-9F3E-1242B3806D24}" dt="2018-04-16T20:56:57.745" v="2779" actId="20577"/>
+        <pc:chgData name="Moritz Spiller" userId="ee7d68fad518d8d2" providerId="LiveId" clId="{F8A47109-9EF6-4448-9F3E-1242B3806D24}" dt="2018-04-17T20:27:14.848" v="2781" actId="20577"/>
         <pc:sldMkLst>
           <pc:docMk/>
           <pc:sldMk cId="3703689330" sldId="262"/>
@@ -698,7 +698,7 @@
         </pc:spChg>
       </pc:sldChg>
       <pc:sldChg chg="modNotesTx">
-        <pc:chgData name="Moritz Spiller" userId="ee7d68fad518d8d2" providerId="LiveId" clId="{F8A47109-9EF6-4448-9F3E-1242B3806D24}" dt="2018-04-16T20:50:30.990" v="2711" actId="20577"/>
+        <pc:chgData name="Moritz Spiller" userId="ee7d68fad518d8d2" providerId="LiveId" clId="{F8A47109-9EF6-4448-9F3E-1242B3806D24}" dt="2018-04-17T20:38:07.808" v="2784" actId="20577"/>
         <pc:sldMkLst>
           <pc:docMk/>
           <pc:sldMk cId="3466993102" sldId="264"/>
@@ -908,7 +908,7 @@
             <a:fld id="{1715D416-169F-4C7D-9A97-B9A721101B5F}" type="datetimeFigureOut">
               <a:rPr lang="en-US" smtClean="0"/>
               <a:pPr/>
-              <a:t>4/16/2018</a:t>
+              <a:t>4/17/2018</a:t>
             </a:fld>
             <a:endParaRPr lang="en-US"/>
           </a:p>
@@ -1851,7 +1851,7 @@
             </a:r>
             <a:r>
               <a:rPr lang="de-DE" dirty="0" err="1"/>
-              <a:t>specifig</a:t>
+              <a:t>specific</a:t>
             </a:r>
             <a:r>
               <a:rPr lang="de-DE" dirty="0"/>
@@ -2670,7 +2670,7 @@
             </a:r>
             <a:r>
               <a:rPr lang="de-DE" dirty="0"/>
-              <a:t> so far or all </a:t>
+              <a:t> so far or </a:t>
             </a:r>
             <a:r>
               <a:rPr lang="de-DE" dirty="0" err="1"/>

</xml_diff>

<commit_message>
minor changes in notes
</commit_message>
<xml_diff>
--- a/Publishments/03_Presentations/01_TeamPresentation/01_TeamPresentation_CurryWurst.pptx
+++ b/Publishments/03_Presentations/01_TeamPresentation/01_TeamPresentation_CurryWurst.pptx
@@ -595,7 +595,7 @@
   <pc:docChgLst>
     <pc:chgData name="Moritz Spiller" userId="ee7d68fad518d8d2" providerId="LiveId" clId="{F8A47109-9EF6-4448-9F3E-1242B3806D24}"/>
     <pc:docChg chg="custSel modSld modMainMaster">
-      <pc:chgData name="Moritz Spiller" userId="ee7d68fad518d8d2" providerId="LiveId" clId="{F8A47109-9EF6-4448-9F3E-1242B3806D24}" dt="2018-04-17T20:38:07.808" v="2784" actId="20577"/>
+      <pc:chgData name="Moritz Spiller" userId="ee7d68fad518d8d2" providerId="LiveId" clId="{F8A47109-9EF6-4448-9F3E-1242B3806D24}" dt="2018-04-18T07:16:17.335" v="2813" actId="20577"/>
       <pc:docMkLst>
         <pc:docMk/>
       </pc:docMkLst>
@@ -668,7 +668,7 @@
         </pc:spChg>
       </pc:sldChg>
       <pc:sldChg chg="modSp modNotesTx">
-        <pc:chgData name="Moritz Spiller" userId="ee7d68fad518d8d2" providerId="LiveId" clId="{F8A47109-9EF6-4448-9F3E-1242B3806D24}" dt="2018-04-17T20:27:14.848" v="2781" actId="20577"/>
+        <pc:chgData name="Moritz Spiller" userId="ee7d68fad518d8d2" providerId="LiveId" clId="{F8A47109-9EF6-4448-9F3E-1242B3806D24}" dt="2018-04-18T07:16:17.335" v="2813" actId="20577"/>
         <pc:sldMkLst>
           <pc:docMk/>
           <pc:sldMk cId="3703689330" sldId="262"/>
@@ -908,7 +908,7 @@
             <a:fld id="{1715D416-169F-4C7D-9A97-B9A721101B5F}" type="datetimeFigureOut">
               <a:rPr lang="en-US" smtClean="0"/>
               <a:pPr/>
-              <a:t>4/17/2018</a:t>
+              <a:t>4/18/2018</a:t>
             </a:fld>
             <a:endParaRPr lang="en-US"/>
           </a:p>
@@ -1672,15 +1672,34 @@
             </a:r>
             <a:r>
               <a:rPr lang="de-DE" dirty="0"/>
-              <a:t> Engineering, Industrial Engineering), </a:t>
-            </a:r>
+              <a:t> Engineering, Industrial Engineering, Automation), </a:t>
+            </a:r>
+          </a:p>
+          <a:p>
+            <a:pPr marL="0" marR="0" lvl="0" indent="0" algn="l" defTabSz="914400" rtl="0" eaLnBrk="1" fontAlgn="auto" latinLnBrk="0" hangingPunct="1">
+              <a:lnSpc>
+                <a:spcPct val="100000"/>
+              </a:lnSpc>
+              <a:spcBef>
+                <a:spcPts val="0"/>
+              </a:spcBef>
+              <a:spcAft>
+                <a:spcPts val="0"/>
+              </a:spcAft>
+              <a:buClrTx/>
+              <a:buSzTx/>
+              <a:buFontTx/>
+              <a:buNone/>
+              <a:tabLst/>
+              <a:defRPr/>
+            </a:pPr>
             <a:r>
               <a:rPr lang="de-DE" dirty="0" err="1"/>
               <a:t>experiences</a:t>
             </a:r>
             <a:r>
               <a:rPr lang="de-DE" dirty="0"/>
-              <a:t> (</a:t>
+              <a:t> (Scrum, Java, </a:t>
             </a:r>
             <a:r>
               <a:rPr lang="de-DE" dirty="0" err="1"/>
@@ -1769,38 +1788,6 @@
             <a:endParaRPr lang="de-DE" dirty="0"/>
           </a:p>
           <a:p>
-            <a:r>
-              <a:rPr lang="de-DE" dirty="0" err="1"/>
-              <a:t>Everybody</a:t>
-            </a:r>
-            <a:r>
-              <a:rPr lang="de-DE" dirty="0"/>
-              <a:t> will </a:t>
-            </a:r>
-            <a:r>
-              <a:rPr lang="de-DE" dirty="0" err="1"/>
-              <a:t>state</a:t>
-            </a:r>
-            <a:r>
-              <a:rPr lang="de-DE" dirty="0"/>
-              <a:t> </a:t>
-            </a:r>
-            <a:r>
-              <a:rPr lang="de-DE" dirty="0" err="1"/>
-              <a:t>his</a:t>
-            </a:r>
-            <a:r>
-              <a:rPr lang="de-DE" dirty="0"/>
-              <a:t>/ her </a:t>
-            </a:r>
-            <a:r>
-              <a:rPr lang="de-DE" dirty="0" err="1"/>
-              <a:t>opinion</a:t>
-            </a:r>
-            <a:r>
-              <a:rPr lang="de-DE" dirty="0"/>
-              <a:t> and </a:t>
-            </a:r>
             <a:r>
               <a:rPr lang="de-DE" dirty="0" err="1"/>
               <a:t>we</a:t>

</xml_diff>